<commit_message>
payroll status update step 2 & 3 API updated
</commit_message>
<xml_diff>
--- a/doc/Payroll Web UI.pptx
+++ b/doc/Payroll Web UI.pptx
@@ -1339,7 +1339,7 @@
           <a:p>
             <a:fld id="{DA6193BC-4F03-4D50-9CD1-8060DE3917E8}" type="datetimeFigureOut">
               <a:rPr lang="en-US" smtClean="0"/>
-              <a:t>10/21/2017</a:t>
+              <a:t>10/22/2017</a:t>
             </a:fld>
             <a:endParaRPr lang="en-US"/>
           </a:p>
@@ -1577,7 +1577,7 @@
           <a:p>
             <a:fld id="{DA6193BC-4F03-4D50-9CD1-8060DE3917E8}" type="datetimeFigureOut">
               <a:rPr lang="en-US" smtClean="0"/>
-              <a:t>10/21/2017</a:t>
+              <a:t>10/22/2017</a:t>
             </a:fld>
             <a:endParaRPr lang="en-US"/>
           </a:p>
@@ -1757,7 +1757,7 @@
           <a:p>
             <a:fld id="{DA6193BC-4F03-4D50-9CD1-8060DE3917E8}" type="datetimeFigureOut">
               <a:rPr lang="en-US" smtClean="0"/>
-              <a:t>10/21/2017</a:t>
+              <a:t>10/22/2017</a:t>
             </a:fld>
             <a:endParaRPr lang="en-US"/>
           </a:p>
@@ -1927,7 +1927,7 @@
           <a:p>
             <a:fld id="{DA6193BC-4F03-4D50-9CD1-8060DE3917E8}" type="datetimeFigureOut">
               <a:rPr lang="en-US" smtClean="0"/>
-              <a:t>10/21/2017</a:t>
+              <a:t>10/22/2017</a:t>
             </a:fld>
             <a:endParaRPr lang="en-US"/>
           </a:p>
@@ -2203,7 +2203,7 @@
           <a:p>
             <a:fld id="{DA6193BC-4F03-4D50-9CD1-8060DE3917E8}" type="datetimeFigureOut">
               <a:rPr lang="en-US" smtClean="0"/>
-              <a:t>10/21/2017</a:t>
+              <a:t>10/22/2017</a:t>
             </a:fld>
             <a:endParaRPr lang="en-US"/>
           </a:p>
@@ -3404,7 +3404,7 @@
           <a:p>
             <a:fld id="{DA6193BC-4F03-4D50-9CD1-8060DE3917E8}" type="datetimeFigureOut">
               <a:rPr lang="en-US" smtClean="0"/>
-              <a:t>10/21/2017</a:t>
+              <a:t>10/22/2017</a:t>
             </a:fld>
             <a:endParaRPr lang="en-US"/>
           </a:p>
@@ -3794,7 +3794,7 @@
           <a:p>
             <a:fld id="{DA6193BC-4F03-4D50-9CD1-8060DE3917E8}" type="datetimeFigureOut">
               <a:rPr lang="en-US" smtClean="0"/>
-              <a:t>10/21/2017</a:t>
+              <a:t>10/22/2017</a:t>
             </a:fld>
             <a:endParaRPr lang="en-US"/>
           </a:p>
@@ -3917,7 +3917,7 @@
           <a:p>
             <a:fld id="{DA6193BC-4F03-4D50-9CD1-8060DE3917E8}" type="datetimeFigureOut">
               <a:rPr lang="en-US" smtClean="0"/>
-              <a:t>10/21/2017</a:t>
+              <a:t>10/22/2017</a:t>
             </a:fld>
             <a:endParaRPr lang="en-US"/>
           </a:p>
@@ -4012,7 +4012,7 @@
           <a:p>
             <a:fld id="{DA6193BC-4F03-4D50-9CD1-8060DE3917E8}" type="datetimeFigureOut">
               <a:rPr lang="en-US" smtClean="0"/>
-              <a:t>10/21/2017</a:t>
+              <a:t>10/22/2017</a:t>
             </a:fld>
             <a:endParaRPr lang="en-US"/>
           </a:p>
@@ -4775,7 +4775,7 @@
           <a:p>
             <a:fld id="{DA6193BC-4F03-4D50-9CD1-8060DE3917E8}" type="datetimeFigureOut">
               <a:rPr lang="en-US" smtClean="0"/>
-              <a:t>10/21/2017</a:t>
+              <a:t>10/22/2017</a:t>
             </a:fld>
             <a:endParaRPr lang="en-US"/>
           </a:p>
@@ -5615,7 +5615,7 @@
           <a:p>
             <a:fld id="{DA6193BC-4F03-4D50-9CD1-8060DE3917E8}" type="datetimeFigureOut">
               <a:rPr lang="en-US" smtClean="0"/>
-              <a:t>10/21/2017</a:t>
+              <a:t>10/22/2017</a:t>
             </a:fld>
             <a:endParaRPr lang="en-US"/>
           </a:p>
@@ -5842,7 +5842,7 @@
           <a:p>
             <a:fld id="{DA6193BC-4F03-4D50-9CD1-8060DE3917E8}" type="datetimeFigureOut">
               <a:rPr lang="en-US" smtClean="0"/>
-              <a:t>10/21/2017</a:t>
+              <a:t>10/22/2017</a:t>
             </a:fld>
             <a:endParaRPr lang="en-US"/>
           </a:p>
@@ -7033,6 +7033,10 @@
               <a:rPr lang="en-US" altLang="zh-CN" dirty="0"/>
               <a:t>Step 1 –Period</a:t>
             </a:r>
+            <a:r>
+              <a:rPr lang="zh-CN" altLang="en-US" dirty="0"/>
+              <a:t>区间</a:t>
+            </a:r>
             <a:endParaRPr lang="en-US" dirty="0"/>
           </a:p>
         </p:txBody>
@@ -7426,6 +7430,10 @@
               <a:rPr lang="en-US" altLang="zh-CN" dirty="0"/>
               <a:t>Step 2 – transaction</a:t>
             </a:r>
+            <a:r>
+              <a:rPr lang="zh-CN" altLang="en-US" dirty="0"/>
+              <a:t>事务</a:t>
+            </a:r>
             <a:endParaRPr lang="en-US" dirty="0"/>
           </a:p>
         </p:txBody>
@@ -7474,7 +7482,7 @@
             </a:br>
             <a:r>
               <a:rPr lang="en-US" altLang="zh-CN" dirty="0"/>
-              <a:t>1: Done</a:t>
+              <a:t>1: Preview</a:t>
             </a:r>
             <a:br>
               <a:rPr lang="en-US" altLang="zh-CN" dirty="0"/>
@@ -7659,15 +7667,7 @@
             </a:r>
             <a:r>
               <a:rPr lang="zh-CN" altLang="en-US" dirty="0"/>
-              <a:t>调用</a:t>
-            </a:r>
-            <a:r>
-              <a:rPr lang="en-US" altLang="zh-CN" dirty="0" err="1"/>
-              <a:t>AddTrans</a:t>
-            </a:r>
-            <a:r>
-              <a:rPr lang="en-US" altLang="zh-CN" dirty="0"/>
-              <a:t> &amp; </a:t>
+              <a:t>调用 </a:t>
             </a:r>
             <a:r>
               <a:rPr lang="en-US" altLang="zh-CN" dirty="0" err="1"/>
@@ -7699,11 +7699,35 @@
             </a:r>
             <a:r>
               <a:rPr lang="en-US" altLang="zh-CN" dirty="0"/>
-              <a:t>Done</a:t>
-            </a:r>
-            <a:r>
-              <a:rPr lang="zh-CN" altLang="en-US" dirty="0"/>
-              <a:t>状态，若</a:t>
+              <a:t>Preview</a:t>
+            </a:r>
+            <a:r>
+              <a:rPr lang="zh-CN" altLang="en-US" dirty="0"/>
+              <a:t>状态，若任意</a:t>
+            </a:r>
+            <a:r>
+              <a:rPr lang="en-US" altLang="zh-CN" dirty="0"/>
+              <a:t>API</a:t>
+            </a:r>
+            <a:r>
+              <a:rPr lang="zh-CN" altLang="en-US" dirty="0"/>
+              <a:t>返回</a:t>
+            </a:r>
+            <a:r>
+              <a:rPr lang="en-US" altLang="zh-CN" dirty="0"/>
+              <a:t>Code</a:t>
+            </a:r>
+            <a:r>
+              <a:rPr lang="zh-CN" altLang="en-US" dirty="0"/>
+              <a:t>不为</a:t>
+            </a:r>
+            <a:r>
+              <a:rPr lang="en-US" altLang="zh-CN" dirty="0"/>
+              <a:t>0</a:t>
+            </a:r>
+            <a:r>
+              <a:rPr lang="zh-CN" altLang="en-US" dirty="0"/>
+              <a:t>，显示</a:t>
             </a:r>
             <a:r>
               <a:rPr lang="en-US" altLang="zh-CN" dirty="0"/>
@@ -7711,31 +7735,7 @@
             </a:r>
             <a:r>
               <a:rPr lang="zh-CN" altLang="en-US" dirty="0"/>
-              <a:t>任意</a:t>
-            </a:r>
-            <a:r>
-              <a:rPr lang="en-US" altLang="zh-CN" dirty="0"/>
-              <a:t>API</a:t>
-            </a:r>
-            <a:r>
-              <a:rPr lang="zh-CN" altLang="en-US" dirty="0"/>
-              <a:t>返回</a:t>
-            </a:r>
-            <a:r>
-              <a:rPr lang="en-US" altLang="zh-CN" dirty="0"/>
-              <a:t>Code</a:t>
-            </a:r>
-            <a:r>
-              <a:rPr lang="zh-CN" altLang="en-US" dirty="0"/>
-              <a:t>不为</a:t>
-            </a:r>
-            <a:r>
-              <a:rPr lang="en-US" altLang="zh-CN" dirty="0"/>
-              <a:t>0</a:t>
-            </a:r>
-            <a:r>
-              <a:rPr lang="zh-CN" altLang="en-US" dirty="0"/>
-              <a:t>，显示状态</a:t>
+              <a:t>状态</a:t>
             </a:r>
             <a:r>
               <a:rPr lang="en-US" altLang="zh-CN" dirty="0"/>
@@ -7751,71 +7751,52 @@
             </a:r>
             <a:r>
               <a:rPr lang="zh-CN" altLang="en-US" dirty="0"/>
-              <a:t>能看到服务器返回的错误信息）</a:t>
+              <a:t>能看到服务器返回的错误信息）用户再次单击</a:t>
+            </a:r>
+            <a:r>
+              <a:rPr lang="en-US" altLang="zh-CN" dirty="0"/>
+              <a:t>Start</a:t>
+            </a:r>
+            <a:r>
+              <a:rPr lang="zh-CN" altLang="en-US" dirty="0"/>
+              <a:t>则重新开始该用户的计算</a:t>
             </a:r>
             <a:br>
               <a:rPr lang="en-US" altLang="zh-CN" dirty="0"/>
             </a:br>
             <a:r>
               <a:rPr lang="en-US" altLang="zh-CN" dirty="0"/>
-              <a:t>	</a:t>
-            </a:r>
-            <a:r>
-              <a:rPr lang="zh-CN" altLang="en-US" dirty="0"/>
-              <a:t>用户再次单击</a:t>
-            </a:r>
-            <a:r>
-              <a:rPr lang="en-US" altLang="zh-CN" dirty="0"/>
-              <a:t>Start</a:t>
-            </a:r>
-            <a:r>
-              <a:rPr lang="zh-CN" altLang="en-US" dirty="0"/>
-              <a:t>则重新开始该用户的计算</a:t>
+              <a:t>Report: </a:t>
+            </a:r>
+            <a:r>
+              <a:rPr lang="zh-CN" altLang="en-US" dirty="0"/>
+              <a:t>只在</a:t>
+            </a:r>
+            <a:r>
+              <a:rPr lang="en-US" altLang="zh-CN" dirty="0"/>
+              <a:t>Committed</a:t>
+            </a:r>
+            <a:r>
+              <a:rPr lang="zh-CN" altLang="en-US" dirty="0"/>
+              <a:t>状态时显示，跳转报表详情页面</a:t>
+            </a:r>
+            <a:endParaRPr lang="en-US" altLang="zh-CN" dirty="0"/>
+          </a:p>
+          <a:p>
+            <a:r>
+              <a:rPr lang="zh-CN" altLang="en-US" dirty="0"/>
+              <a:t>页操作按钮</a:t>
             </a:r>
             <a:br>
               <a:rPr lang="en-US" altLang="zh-CN" dirty="0"/>
             </a:br>
             <a:r>
               <a:rPr lang="en-US" altLang="zh-CN" dirty="0"/>
-              <a:t>Report: </a:t>
-            </a:r>
-            <a:r>
-              <a:rPr lang="zh-CN" altLang="en-US" dirty="0"/>
-              <a:t>只在</a:t>
-            </a:r>
-            <a:r>
-              <a:rPr lang="en-US" altLang="zh-CN" dirty="0"/>
-              <a:t>Committed</a:t>
-            </a:r>
-            <a:r>
-              <a:rPr lang="zh-CN" altLang="en-US" dirty="0"/>
-              <a:t>状态时显示，跳转报表详情页面</a:t>
-            </a:r>
-            <a:endParaRPr lang="en-US" altLang="zh-CN" dirty="0"/>
-          </a:p>
-          <a:p>
-            <a:r>
-              <a:rPr lang="zh-CN" altLang="en-US" dirty="0"/>
-              <a:t>页操作按钮</a:t>
-            </a:r>
-            <a:br>
-              <a:rPr lang="en-US" altLang="zh-CN" dirty="0"/>
-            </a:br>
-            <a:r>
-              <a:rPr lang="en-US" altLang="zh-CN" dirty="0"/>
               <a:t>Start All: </a:t>
             </a:r>
             <a:r>
               <a:rPr lang="zh-CN" altLang="en-US" dirty="0"/>
-              <a:t>循环遍历每一个员工依次调用</a:t>
-            </a:r>
-            <a:r>
-              <a:rPr lang="en-US" altLang="zh-CN" dirty="0" err="1"/>
-              <a:t>AddTrans</a:t>
-            </a:r>
-            <a:r>
-              <a:rPr lang="en-US" altLang="zh-CN" dirty="0"/>
-              <a:t> / </a:t>
+              <a:t>循环遍历每一个员工依次调用 </a:t>
             </a:r>
             <a:r>
               <a:rPr lang="en-US" altLang="zh-CN" dirty="0" err="1"/>
@@ -7887,7 +7868,7 @@
             </a:br>
             <a:r>
               <a:rPr lang="en-US" altLang="zh-CN" dirty="0"/>
-              <a:t>Generate Report: </a:t>
+              <a:t>Preview: </a:t>
             </a:r>
             <a:r>
               <a:rPr lang="zh-CN" altLang="en-US" dirty="0"/>
@@ -7895,11 +7876,30 @@
             </a:r>
             <a:r>
               <a:rPr lang="en-US" altLang="zh-CN" dirty="0"/>
-              <a:t>Done</a:t>
-            </a:r>
-            <a:r>
-              <a:rPr lang="zh-CN" altLang="en-US" dirty="0"/>
-              <a:t>或</a:t>
+              <a:t>Preview</a:t>
+            </a:r>
+            <a:r>
+              <a:rPr lang="zh-CN" altLang="en-US" dirty="0"/>
+              <a:t>时显示，跳转</a:t>
+            </a:r>
+            <a:r>
+              <a:rPr lang="en-US" altLang="zh-CN" dirty="0"/>
+              <a:t>Step 3</a:t>
+            </a:r>
+            <a:r>
+              <a:rPr lang="zh-CN" altLang="en-US" dirty="0"/>
+              <a:t>准备生成报表</a:t>
+            </a:r>
+            <a:br>
+              <a:rPr lang="en-US" altLang="zh-CN" dirty="0"/>
+            </a:br>
+            <a:r>
+              <a:rPr lang="en-US" altLang="zh-CN" dirty="0"/>
+              <a:t>View Report: </a:t>
+            </a:r>
+            <a:r>
+              <a:rPr lang="zh-CN" altLang="en-US" dirty="0"/>
+              <a:t>所有员工状态为</a:t>
             </a:r>
             <a:r>
               <a:rPr lang="en-US" altLang="zh-CN" dirty="0"/>
@@ -7907,15 +7907,7 @@
             </a:r>
             <a:r>
               <a:rPr lang="zh-CN" altLang="en-US" dirty="0"/>
-              <a:t>时显示，跳转</a:t>
-            </a:r>
-            <a:r>
-              <a:rPr lang="en-US" altLang="zh-CN" dirty="0"/>
-              <a:t>Step 3</a:t>
-            </a:r>
-            <a:r>
-              <a:rPr lang="zh-CN" altLang="en-US" dirty="0"/>
-              <a:t>准备生成报表</a:t>
+              <a:t>时显示，跳转报表详情页</a:t>
             </a:r>
             <a:endParaRPr lang="en-US" altLang="zh-CN" dirty="0"/>
           </a:p>
@@ -7985,7 +7977,11 @@
             </a:br>
             <a:r>
               <a:rPr lang="en-US" altLang="zh-CN" dirty="0"/>
-              <a:t>Step 3 – Report</a:t>
+              <a:t>Step 3 – Preview</a:t>
+            </a:r>
+            <a:r>
+              <a:rPr lang="zh-CN" altLang="en-US" dirty="0"/>
+              <a:t>预览</a:t>
             </a:r>
             <a:endParaRPr lang="en-US" dirty="0"/>
           </a:p>
@@ -8015,7 +8011,7 @@
         </p:spPr>
         <p:txBody>
           <a:bodyPr>
-            <a:normAutofit fontScale="92500" lnSpcReduction="20000"/>
+            <a:normAutofit fontScale="92500" lnSpcReduction="10000"/>
           </a:bodyPr>
           <a:lstStyle/>
           <a:p>
@@ -8031,57 +8027,64 @@
               <a:rPr lang="zh-CN" altLang="en-US" dirty="0"/>
               <a:t>内所有员工</a:t>
             </a:r>
-            <a:r>
-              <a:rPr lang="en-US" altLang="zh-CN" dirty="0"/>
-              <a:t>/p/select?c=payrolltrans.empcode,employee.fullchinesename,payrolltrans.payrollstatus,employee.companycode,payrolltrans.periodcode&amp;g=payrolltrans.payrollstatus,payrolltrans.empcode,employee.fullchinesename,employee.companycode,payrolltrans.periodcode&amp;w=employee.companycode LK </a:t>
-            </a:r>
-            <a:r>
-              <a:rPr lang="en-US" altLang="zh-CN" dirty="0" err="1">
-                <a:solidFill>
-                  <a:schemeClr val="accent5">
-                    <a:lumMod val="75000"/>
-                  </a:schemeClr>
-                </a:solidFill>
-              </a:rPr>
-              <a:t>TFHK</a:t>
+            <a:br>
+              <a:rPr lang="en-US" altLang="zh-CN" dirty="0"/>
+            </a:br>
+            <a:r>
+              <a:rPr lang="en-US" altLang="zh-CN" dirty="0"/>
+              <a:t>/p/</a:t>
             </a:r>
             <a:r>
               <a:rPr lang="en-US" altLang="zh-CN" dirty="0" err="1"/>
-              <a:t>,payrolltrans.periodcode</a:t>
-            </a:r>
-            <a:r>
-              <a:rPr lang="en-US" altLang="zh-CN" dirty="0"/>
-              <a:t> LK </a:t>
-            </a:r>
-            <a:r>
-              <a:rPr lang="en-US" altLang="zh-CN" dirty="0">
-                <a:solidFill>
-                  <a:schemeClr val="accent5">
-                    <a:lumMod val="75000"/>
-                  </a:schemeClr>
-                </a:solidFill>
-              </a:rPr>
-              <a:t>ltdpd1</a:t>
-            </a:r>
-            <a:r>
-              <a:rPr lang="en-US" altLang="zh-CN" dirty="0"/>
-              <a:t>,payrolltrans.payrollstatus EQ </a:t>
-            </a:r>
-            <a:r>
-              <a:rPr lang="en-US" altLang="zh-CN" dirty="0">
-                <a:solidFill>
-                  <a:schemeClr val="accent5">
-                    <a:lumMod val="75000"/>
-                  </a:schemeClr>
-                </a:solidFill>
-              </a:rPr>
-              <a:t>2</a:t>
+              <a:t>preview?periodcode</a:t>
+            </a:r>
+            <a:r>
+              <a:rPr lang="en-US" altLang="zh-CN" dirty="0"/>
+              <a:t>=[</a:t>
+            </a:r>
+            <a:r>
+              <a:rPr lang="zh-CN" altLang="en-US" dirty="0"/>
+              <a:t>区间</a:t>
+            </a:r>
+            <a:r>
+              <a:rPr lang="en-US" altLang="zh-CN" dirty="0"/>
+              <a:t>]&amp;</a:t>
+            </a:r>
+            <a:r>
+              <a:rPr lang="en-US" altLang="zh-CN" dirty="0" err="1"/>
+              <a:t>companycode</a:t>
+            </a:r>
+            <a:r>
+              <a:rPr lang="en-US" altLang="zh-CN" dirty="0"/>
+              <a:t>=[</a:t>
+            </a:r>
+            <a:r>
+              <a:rPr lang="zh-CN" altLang="en-US" dirty="0"/>
+              <a:t>公司</a:t>
+            </a:r>
+            <a:r>
+              <a:rPr lang="en-US" altLang="zh-CN" dirty="0"/>
+              <a:t>]&amp;</a:t>
+            </a:r>
+            <a:r>
+              <a:rPr lang="en-US" altLang="zh-CN" dirty="0" err="1"/>
+              <a:t>empcode</a:t>
+            </a:r>
+            <a:r>
+              <a:rPr lang="en-US" altLang="zh-CN" dirty="0"/>
+              <a:t>=[</a:t>
+            </a:r>
+            <a:r>
+              <a:rPr lang="zh-CN" altLang="en-US" dirty="0"/>
+              <a:t>员工（可选）</a:t>
+            </a:r>
+            <a:r>
+              <a:rPr lang="en-US" altLang="zh-CN" dirty="0"/>
+              <a:t>]</a:t>
             </a:r>
             <a:endParaRPr lang="en-US" altLang="zh-CN" b="1" dirty="0">
               <a:solidFill>
-                <a:schemeClr val="accent5">
-                  <a:lumMod val="75000"/>
-                </a:schemeClr>
+                <a:srgbClr val="FF0000"/>
               </a:solidFill>
             </a:endParaRPr>
           </a:p>
@@ -8139,7 +8142,7 @@
             </a:br>
             <a:r>
               <a:rPr lang="en-US" altLang="zh-CN" dirty="0"/>
-              <a:t>Start: </a:t>
+              <a:t>Generate: </a:t>
             </a:r>
             <a:r>
               <a:rPr lang="zh-CN" altLang="en-US" dirty="0"/>
@@ -8163,55 +8166,168 @@
             </a:r>
             <a:r>
               <a:rPr lang="zh-CN" altLang="en-US" dirty="0"/>
-              <a:t>直到</a:t>
+              <a:t>直到返回结果后设为</a:t>
+            </a:r>
+            <a:r>
+              <a:rPr lang="en-US" altLang="zh-CN" dirty="0"/>
+              <a:t>Committed</a:t>
+            </a:r>
+            <a:br>
+              <a:rPr lang="en-US" altLang="zh-CN" dirty="0"/>
+            </a:br>
+            <a:r>
+              <a:rPr lang="en-US" altLang="zh-CN" dirty="0"/>
+              <a:t>	</a:t>
+            </a:r>
+            <a:r>
+              <a:rPr lang="zh-CN" altLang="en-US" dirty="0"/>
+              <a:t>状态，若</a:t>
+            </a:r>
+            <a:r>
+              <a:rPr lang="en-US" altLang="zh-CN" dirty="0"/>
+              <a:t>API</a:t>
+            </a:r>
+            <a:r>
+              <a:rPr lang="zh-CN" altLang="en-US" dirty="0"/>
+              <a:t>返回出错，显示状态</a:t>
+            </a:r>
+            <a:r>
+              <a:rPr lang="en-US" altLang="zh-CN" dirty="0"/>
+              <a:t>Error</a:t>
+            </a:r>
+            <a:r>
+              <a:rPr lang="zh-CN" altLang="en-US" dirty="0"/>
+              <a:t>（用户单击</a:t>
+            </a:r>
+            <a:r>
+              <a:rPr lang="en-US" altLang="zh-CN" dirty="0"/>
+              <a:t>Error</a:t>
+            </a:r>
+            <a:r>
+              <a:rPr lang="zh-CN" altLang="en-US" dirty="0"/>
+              <a:t>能看到服务器返回的错误信息）</a:t>
+            </a:r>
+            <a:br>
+              <a:rPr lang="en-US" altLang="zh-CN" dirty="0"/>
+            </a:br>
+            <a:r>
+              <a:rPr lang="en-US" altLang="zh-CN" dirty="0"/>
+              <a:t>	</a:t>
+            </a:r>
+            <a:r>
+              <a:rPr lang="zh-CN" altLang="en-US" dirty="0"/>
+              <a:t>用户再次单击</a:t>
+            </a:r>
+            <a:r>
+              <a:rPr lang="en-US" altLang="zh-CN" dirty="0"/>
+              <a:t>Start</a:t>
+            </a:r>
+            <a:r>
+              <a:rPr lang="zh-CN" altLang="en-US" dirty="0"/>
+              <a:t>则重新开始生成该用户的报表 </a:t>
+            </a:r>
+            <a:br>
+              <a:rPr lang="en-US" altLang="zh-CN" dirty="0"/>
+            </a:br>
+            <a:r>
+              <a:rPr lang="en-US" altLang="zh-CN" dirty="0"/>
+              <a:t>	/p/</a:t>
             </a:r>
             <a:r>
               <a:rPr lang="en-US" altLang="zh-CN" dirty="0" err="1"/>
-              <a:t>NewReport</a:t>
-            </a:r>
-            <a:r>
-              <a:rPr lang="zh-CN" altLang="en-US" dirty="0"/>
-              <a:t>返回结果后设为</a:t>
-            </a:r>
-            <a:r>
-              <a:rPr lang="en-US" altLang="zh-CN" dirty="0"/>
-              <a:t>Done</a:t>
-            </a:r>
-            <a:r>
-              <a:rPr lang="zh-CN" altLang="en-US" dirty="0"/>
-              <a:t>状态，</a:t>
-            </a:r>
+              <a:t>generate?periodcode</a:t>
+            </a:r>
+            <a:r>
+              <a:rPr lang="en-US" altLang="zh-CN" dirty="0"/>
+              <a:t>=[</a:t>
+            </a:r>
+            <a:r>
+              <a:rPr lang="zh-CN" altLang="en-US" dirty="0"/>
+              <a:t>区间</a:t>
+            </a:r>
+            <a:r>
+              <a:rPr lang="en-US" altLang="zh-CN" dirty="0"/>
+              <a:t>] &amp;</a:t>
+            </a:r>
+            <a:r>
+              <a:rPr lang="en-US" altLang="zh-CN" dirty="0" err="1"/>
+              <a:t>empcode</a:t>
+            </a:r>
+            <a:r>
+              <a:rPr lang="en-US" altLang="zh-CN" dirty="0"/>
+              <a:t>=[</a:t>
+            </a:r>
+            <a:r>
+              <a:rPr lang="zh-CN" altLang="en-US" dirty="0"/>
+              <a:t>员工</a:t>
+            </a:r>
+            <a:r>
+              <a:rPr lang="en-US" altLang="zh-CN" dirty="0"/>
+              <a:t>]</a:t>
+            </a:r>
+            <a:br>
+              <a:rPr lang="en-US" altLang="zh-CN" dirty="0"/>
+            </a:br>
+            <a:r>
+              <a:rPr lang="en-US" altLang="zh-CN" dirty="0"/>
+              <a:t>Report: </a:t>
+            </a:r>
+            <a:r>
+              <a:rPr lang="zh-CN" altLang="en-US" dirty="0"/>
+              <a:t>只在</a:t>
+            </a:r>
+            <a:r>
+              <a:rPr lang="en-US" altLang="zh-CN" dirty="0"/>
+              <a:t>Committed</a:t>
+            </a:r>
+            <a:r>
+              <a:rPr lang="zh-CN" altLang="en-US" dirty="0"/>
+              <a:t>状态时显示，跳转报表详情页面</a:t>
+            </a:r>
+            <a:endParaRPr lang="en-US" altLang="zh-CN" dirty="0"/>
+          </a:p>
+          <a:p>
+            <a:r>
+              <a:rPr lang="zh-CN" altLang="en-US" dirty="0"/>
+              <a:t>页操作按钮</a:t>
+            </a:r>
+            <a:br>
+              <a:rPr lang="en-US" altLang="zh-CN" dirty="0"/>
+            </a:br>
+            <a:r>
+              <a:rPr lang="en-US" altLang="zh-CN" dirty="0"/>
+              <a:t>Generate All: </a:t>
+            </a:r>
+            <a:r>
+              <a:rPr lang="zh-CN" altLang="en-US" dirty="0"/>
+              <a:t>循环遍历每一个员工依次调用</a:t>
+            </a:r>
+            <a:r>
+              <a:rPr lang="en-US" altLang="zh-CN" dirty="0"/>
+              <a:t>New Report</a:t>
+            </a:r>
+            <a:r>
+              <a:rPr lang="zh-CN" altLang="en-US" dirty="0"/>
+              <a:t>（单击完后隐藏，显示</a:t>
+            </a:r>
+            <a:r>
+              <a:rPr lang="en-US" altLang="zh-CN" dirty="0"/>
+              <a:t>Stop All</a:t>
+            </a:r>
+            <a:r>
+              <a:rPr lang="zh-CN" altLang="en-US" dirty="0"/>
+              <a:t>）</a:t>
+            </a:r>
+            <a:br>
+              <a:rPr lang="en-US" altLang="zh-CN" dirty="0"/>
+            </a:br>
             <a:r>
               <a:rPr lang="en-US" altLang="zh-CN" dirty="0"/>
               <a:t>	</a:t>
             </a:r>
             <a:r>
               <a:rPr lang="zh-CN" altLang="en-US" dirty="0"/>
-              <a:t>若</a:t>
-            </a:r>
-            <a:r>
-              <a:rPr lang="en-US" altLang="zh-CN" dirty="0"/>
-              <a:t>API</a:t>
-            </a:r>
-            <a:r>
-              <a:rPr lang="zh-CN" altLang="en-US" dirty="0"/>
-              <a:t>返回</a:t>
-            </a:r>
-            <a:r>
-              <a:rPr lang="en-US" altLang="zh-CN" dirty="0"/>
-              <a:t>Code</a:t>
-            </a:r>
-            <a:r>
-              <a:rPr lang="zh-CN" altLang="en-US" dirty="0"/>
-              <a:t>不为</a:t>
-            </a:r>
-            <a:r>
-              <a:rPr lang="en-US" altLang="zh-CN" dirty="0"/>
-              <a:t>0</a:t>
-            </a:r>
-            <a:r>
-              <a:rPr lang="zh-CN" altLang="en-US" dirty="0"/>
-              <a:t>，显示状态</a:t>
+              <a:t>若某员工报表出错（状态为</a:t>
             </a:r>
             <a:r>
               <a:rPr lang="en-US" altLang="zh-CN" dirty="0"/>
@@ -8219,131 +8335,32 @@
             </a:r>
             <a:r>
               <a:rPr lang="zh-CN" altLang="en-US" dirty="0"/>
-              <a:t>（用户单击</a:t>
-            </a:r>
-            <a:r>
-              <a:rPr lang="en-US" altLang="zh-CN" dirty="0"/>
-              <a:t>Error</a:t>
-            </a:r>
-            <a:r>
-              <a:rPr lang="zh-CN" altLang="en-US" dirty="0"/>
-              <a:t>能看到服务器返回的错误信息）</a:t>
+              <a:t>），不影响其他员工计算，循环继续</a:t>
             </a:r>
             <a:br>
               <a:rPr lang="en-US" altLang="zh-CN" dirty="0"/>
             </a:br>
             <a:r>
               <a:rPr lang="en-US" altLang="zh-CN" dirty="0"/>
-              <a:t>	</a:t>
-            </a:r>
-            <a:r>
-              <a:rPr lang="zh-CN" altLang="en-US" dirty="0"/>
-              <a:t>用户再次单击</a:t>
-            </a:r>
-            <a:r>
-              <a:rPr lang="en-US" altLang="zh-CN" dirty="0"/>
-              <a:t>Start</a:t>
-            </a:r>
-            <a:r>
-              <a:rPr lang="zh-CN" altLang="en-US" dirty="0"/>
-              <a:t>则重新开始生成该用户的报表</a:t>
+              <a:t>Stop All: </a:t>
+            </a:r>
+            <a:r>
+              <a:rPr lang="zh-CN" altLang="en-US" dirty="0"/>
+              <a:t>当前员工完成后终止循环（单击后隐藏，显示</a:t>
+            </a:r>
+            <a:r>
+              <a:rPr lang="en-US" altLang="zh-CN" dirty="0"/>
+              <a:t>Start All</a:t>
+            </a:r>
+            <a:r>
+              <a:rPr lang="zh-CN" altLang="en-US" dirty="0"/>
+              <a:t>）</a:t>
             </a:r>
             <a:br>
               <a:rPr lang="en-US" altLang="zh-CN" dirty="0"/>
             </a:br>
             <a:r>
               <a:rPr lang="en-US" altLang="zh-CN" dirty="0"/>
-              <a:t>Report: </a:t>
-            </a:r>
-            <a:r>
-              <a:rPr lang="zh-CN" altLang="en-US" dirty="0"/>
-              <a:t>只在</a:t>
-            </a:r>
-            <a:r>
-              <a:rPr lang="en-US" altLang="zh-CN" dirty="0"/>
-              <a:t>Done</a:t>
-            </a:r>
-            <a:r>
-              <a:rPr lang="zh-CN" altLang="en-US" dirty="0"/>
-              <a:t>状态时显示，跳转报表详情页面</a:t>
-            </a:r>
-            <a:endParaRPr lang="en-US" altLang="zh-CN" dirty="0"/>
-          </a:p>
-          <a:p>
-            <a:r>
-              <a:rPr lang="zh-CN" altLang="en-US" dirty="0"/>
-              <a:t>页操作按钮</a:t>
-            </a:r>
-            <a:br>
-              <a:rPr lang="en-US" altLang="zh-CN" dirty="0"/>
-            </a:br>
-            <a:r>
-              <a:rPr lang="en-US" altLang="zh-CN" dirty="0"/>
-              <a:t>Start All: </a:t>
-            </a:r>
-            <a:r>
-              <a:rPr lang="zh-CN" altLang="en-US" dirty="0"/>
-              <a:t>循环遍历每一个员工依次调用</a:t>
-            </a:r>
-            <a:r>
-              <a:rPr lang="en-US" altLang="zh-CN" dirty="0"/>
-              <a:t>New Report</a:t>
-            </a:r>
-            <a:r>
-              <a:rPr lang="zh-CN" altLang="en-US" dirty="0"/>
-              <a:t>（单击完后隐藏，显示</a:t>
-            </a:r>
-            <a:r>
-              <a:rPr lang="en-US" altLang="zh-CN" dirty="0"/>
-              <a:t>Stop All</a:t>
-            </a:r>
-            <a:r>
-              <a:rPr lang="zh-CN" altLang="en-US" dirty="0"/>
-              <a:t>）</a:t>
-            </a:r>
-            <a:br>
-              <a:rPr lang="en-US" altLang="zh-CN" dirty="0"/>
-            </a:br>
-            <a:r>
-              <a:rPr lang="en-US" altLang="zh-CN" dirty="0"/>
-              <a:t>	</a:t>
-            </a:r>
-            <a:r>
-              <a:rPr lang="zh-CN" altLang="en-US" dirty="0"/>
-              <a:t>若某员工报表出错（状态为</a:t>
-            </a:r>
-            <a:r>
-              <a:rPr lang="en-US" altLang="zh-CN" dirty="0"/>
-              <a:t>Error</a:t>
-            </a:r>
-            <a:r>
-              <a:rPr lang="zh-CN" altLang="en-US" dirty="0"/>
-              <a:t>），不影响其他员工计算，循环继续</a:t>
-            </a:r>
-            <a:br>
-              <a:rPr lang="en-US" altLang="zh-CN" dirty="0"/>
-            </a:br>
-            <a:r>
-              <a:rPr lang="en-US" altLang="zh-CN" dirty="0"/>
-              <a:t>Stop All: </a:t>
-            </a:r>
-            <a:r>
-              <a:rPr lang="zh-CN" altLang="en-US" dirty="0"/>
-              <a:t>当前员工完成后终止循环（单击后隐藏，显示</a:t>
-            </a:r>
-            <a:r>
-              <a:rPr lang="en-US" altLang="zh-CN" dirty="0"/>
-              <a:t>Start All</a:t>
-            </a:r>
-            <a:r>
-              <a:rPr lang="zh-CN" altLang="en-US" dirty="0"/>
-              <a:t>）</a:t>
-            </a:r>
-            <a:br>
-              <a:rPr lang="en-US" altLang="zh-CN" dirty="0"/>
-            </a:br>
-            <a:r>
-              <a:rPr lang="en-US" altLang="zh-CN" dirty="0"/>
               <a:t>View Report: </a:t>
             </a:r>
             <a:r>
@@ -8352,7 +8369,7 @@
             </a:r>
             <a:r>
               <a:rPr lang="en-US" altLang="zh-CN" dirty="0"/>
-              <a:t>Done</a:t>
+              <a:t>Committed</a:t>
             </a:r>
             <a:r>
               <a:rPr lang="zh-CN" altLang="en-US" dirty="0"/>
@@ -8426,7 +8443,11 @@
             </a:br>
             <a:r>
               <a:rPr lang="en-US" altLang="zh-CN" dirty="0"/>
-              <a:t>Step 4 – summary</a:t>
+              <a:t>Step 4 – Report</a:t>
+            </a:r>
+            <a:r>
+              <a:rPr lang="zh-CN" altLang="en-US" dirty="0"/>
+              <a:t>报表</a:t>
             </a:r>
             <a:endParaRPr lang="en-US" dirty="0"/>
           </a:p>
@@ -9065,6 +9086,11 @@
               <a:rPr lang="en-US" dirty="0"/>
               <a:t>Payroll Template</a:t>
             </a:r>
+            <a:r>
+              <a:rPr lang="zh-CN" altLang="en-US" dirty="0"/>
+              <a:t>（配置计算公式）</a:t>
+            </a:r>
+            <a:endParaRPr lang="en-US" dirty="0"/>
           </a:p>
           <a:p>
             <a:r>
@@ -9078,6 +9104,10 @@
               <a:rPr lang="en-US" dirty="0"/>
               <a:t>Basic Info</a:t>
             </a:r>
+            <a:r>
+              <a:rPr lang="zh-CN" altLang="en-US" dirty="0"/>
+              <a:t>（员工基本信息）</a:t>
+            </a:r>
             <a:br>
               <a:rPr lang="en-US" dirty="0"/>
             </a:br>
@@ -9085,6 +9115,10 @@
               <a:rPr lang="en-US" dirty="0"/>
               <a:t>Package</a:t>
             </a:r>
+            <a:r>
+              <a:rPr lang="zh-CN" altLang="en-US" dirty="0"/>
+              <a:t>（员工薪资包）</a:t>
+            </a:r>
             <a:br>
               <a:rPr lang="en-US" dirty="0"/>
             </a:br>
@@ -9092,6 +9126,11 @@
               <a:rPr lang="en-US" dirty="0"/>
               <a:t>Pay Item</a:t>
             </a:r>
+            <a:r>
+              <a:rPr lang="zh-CN" altLang="en-US" dirty="0"/>
+              <a:t>（实报实销）</a:t>
+            </a:r>
+            <a:endParaRPr lang="en-US" dirty="0"/>
           </a:p>
           <a:p>
             <a:r>
@@ -9105,6 +9144,11 @@
               <a:rPr lang="en-US" dirty="0"/>
               <a:t>Import / Export</a:t>
             </a:r>
+            <a:r>
+              <a:rPr lang="zh-CN" altLang="en-US" dirty="0"/>
+              <a:t>（导入导出）</a:t>
+            </a:r>
+            <a:endParaRPr lang="en-US" dirty="0"/>
           </a:p>
         </p:txBody>
       </p:sp>

</xml_diff>

<commit_message>
Step 3 API updated Step 4 API added
</commit_message>
<xml_diff>
--- a/doc/Payroll Web UI.pptx
+++ b/doc/Payroll Web UI.pptx
@@ -18,6 +18,8 @@
     <p:sldId id="265" r:id="rId12"/>
     <p:sldId id="266" r:id="rId13"/>
     <p:sldId id="269" r:id="rId14"/>
+    <p:sldId id="270" r:id="rId15"/>
+    <p:sldId id="271" r:id="rId16"/>
   </p:sldIdLst>
   <p:sldSz cx="12192000" cy="6858000"/>
   <p:notesSz cx="6858000" cy="9144000"/>
@@ -1339,7 +1341,7 @@
           <a:p>
             <a:fld id="{DA6193BC-4F03-4D50-9CD1-8060DE3917E8}" type="datetimeFigureOut">
               <a:rPr lang="en-US" smtClean="0"/>
-              <a:t>10/22/2017</a:t>
+              <a:t>10/28/2017</a:t>
             </a:fld>
             <a:endParaRPr lang="en-US"/>
           </a:p>
@@ -1577,7 +1579,7 @@
           <a:p>
             <a:fld id="{DA6193BC-4F03-4D50-9CD1-8060DE3917E8}" type="datetimeFigureOut">
               <a:rPr lang="en-US" smtClean="0"/>
-              <a:t>10/22/2017</a:t>
+              <a:t>10/28/2017</a:t>
             </a:fld>
             <a:endParaRPr lang="en-US"/>
           </a:p>
@@ -1757,7 +1759,7 @@
           <a:p>
             <a:fld id="{DA6193BC-4F03-4D50-9CD1-8060DE3917E8}" type="datetimeFigureOut">
               <a:rPr lang="en-US" smtClean="0"/>
-              <a:t>10/22/2017</a:t>
+              <a:t>10/28/2017</a:t>
             </a:fld>
             <a:endParaRPr lang="en-US"/>
           </a:p>
@@ -1927,7 +1929,7 @@
           <a:p>
             <a:fld id="{DA6193BC-4F03-4D50-9CD1-8060DE3917E8}" type="datetimeFigureOut">
               <a:rPr lang="en-US" smtClean="0"/>
-              <a:t>10/22/2017</a:t>
+              <a:t>10/28/2017</a:t>
             </a:fld>
             <a:endParaRPr lang="en-US"/>
           </a:p>
@@ -2203,7 +2205,7 @@
           <a:p>
             <a:fld id="{DA6193BC-4F03-4D50-9CD1-8060DE3917E8}" type="datetimeFigureOut">
               <a:rPr lang="en-US" smtClean="0"/>
-              <a:t>10/22/2017</a:t>
+              <a:t>10/28/2017</a:t>
             </a:fld>
             <a:endParaRPr lang="en-US"/>
           </a:p>
@@ -3404,7 +3406,7 @@
           <a:p>
             <a:fld id="{DA6193BC-4F03-4D50-9CD1-8060DE3917E8}" type="datetimeFigureOut">
               <a:rPr lang="en-US" smtClean="0"/>
-              <a:t>10/22/2017</a:t>
+              <a:t>10/28/2017</a:t>
             </a:fld>
             <a:endParaRPr lang="en-US"/>
           </a:p>
@@ -3794,7 +3796,7 @@
           <a:p>
             <a:fld id="{DA6193BC-4F03-4D50-9CD1-8060DE3917E8}" type="datetimeFigureOut">
               <a:rPr lang="en-US" smtClean="0"/>
-              <a:t>10/22/2017</a:t>
+              <a:t>10/28/2017</a:t>
             </a:fld>
             <a:endParaRPr lang="en-US"/>
           </a:p>
@@ -3917,7 +3919,7 @@
           <a:p>
             <a:fld id="{DA6193BC-4F03-4D50-9CD1-8060DE3917E8}" type="datetimeFigureOut">
               <a:rPr lang="en-US" smtClean="0"/>
-              <a:t>10/22/2017</a:t>
+              <a:t>10/28/2017</a:t>
             </a:fld>
             <a:endParaRPr lang="en-US"/>
           </a:p>
@@ -4012,7 +4014,7 @@
           <a:p>
             <a:fld id="{DA6193BC-4F03-4D50-9CD1-8060DE3917E8}" type="datetimeFigureOut">
               <a:rPr lang="en-US" smtClean="0"/>
-              <a:t>10/22/2017</a:t>
+              <a:t>10/28/2017</a:t>
             </a:fld>
             <a:endParaRPr lang="en-US"/>
           </a:p>
@@ -4775,7 +4777,7 @@
           <a:p>
             <a:fld id="{DA6193BC-4F03-4D50-9CD1-8060DE3917E8}" type="datetimeFigureOut">
               <a:rPr lang="en-US" smtClean="0"/>
-              <a:t>10/22/2017</a:t>
+              <a:t>10/28/2017</a:t>
             </a:fld>
             <a:endParaRPr lang="en-US"/>
           </a:p>
@@ -5615,7 +5617,7 @@
           <a:p>
             <a:fld id="{DA6193BC-4F03-4D50-9CD1-8060DE3917E8}" type="datetimeFigureOut">
               <a:rPr lang="en-US" smtClean="0"/>
-              <a:t>10/22/2017</a:t>
+              <a:t>10/28/2017</a:t>
             </a:fld>
             <a:endParaRPr lang="en-US"/>
           </a:p>
@@ -5842,7 +5844,7 @@
           <a:p>
             <a:fld id="{DA6193BC-4F03-4D50-9CD1-8060DE3917E8}" type="datetimeFigureOut">
               <a:rPr lang="en-US" smtClean="0"/>
-              <a:t>10/22/2017</a:t>
+              <a:t>10/28/2017</a:t>
             </a:fld>
             <a:endParaRPr lang="en-US"/>
           </a:p>
@@ -8084,7 +8086,15 @@
             </a:r>
             <a:r>
               <a:rPr lang="zh-CN" altLang="en-US" dirty="0"/>
-              <a:t>员工（可选）</a:t>
+              <a:t>员工（可选参数</a:t>
+            </a:r>
+            <a:r>
+              <a:rPr lang="en-US" altLang="zh-CN" dirty="0"/>
+              <a:t>,</a:t>
+            </a:r>
+            <a:r>
+              <a:rPr lang="zh-CN" altLang="en-US" dirty="0"/>
+              <a:t>逗号分隔）</a:t>
             </a:r>
             <a:r>
               <a:rPr lang="en-US" altLang="zh-CN" dirty="0"/>
@@ -8184,93 +8194,89 @@
               <a:t>调用</a:t>
             </a:r>
             <a:r>
+              <a:rPr lang="en-US" altLang="zh-CN" dirty="0"/>
+              <a:t>Commit API</a:t>
+            </a:r>
+            <a:r>
+              <a:rPr lang="zh-CN" altLang="en-US" dirty="0"/>
+              <a:t>并设置状态为</a:t>
+            </a:r>
+            <a:r>
+              <a:rPr lang="en-US" altLang="zh-CN" dirty="0"/>
+              <a:t>In Progress</a:t>
+            </a:r>
+            <a:r>
+              <a:rPr lang="zh-CN" altLang="en-US" dirty="0"/>
+              <a:t>直到返回结果后设为</a:t>
+            </a:r>
+            <a:r>
+              <a:rPr lang="en-US" altLang="zh-CN" dirty="0"/>
+              <a:t>Committed</a:t>
+            </a:r>
+            <a:br>
+              <a:rPr lang="en-US" altLang="zh-CN" dirty="0"/>
+            </a:br>
+            <a:r>
+              <a:rPr lang="en-US" altLang="zh-CN" dirty="0"/>
+              <a:t>	</a:t>
+            </a:r>
+            <a:r>
+              <a:rPr lang="zh-CN" altLang="en-US" dirty="0"/>
+              <a:t>状态，若</a:t>
+            </a:r>
+            <a:r>
+              <a:rPr lang="en-US" altLang="zh-CN" dirty="0"/>
+              <a:t>API</a:t>
+            </a:r>
+            <a:r>
+              <a:rPr lang="zh-CN" altLang="en-US" dirty="0"/>
+              <a:t>返回出错，显示状态</a:t>
+            </a:r>
+            <a:r>
+              <a:rPr lang="en-US" altLang="zh-CN" dirty="0"/>
+              <a:t>Error</a:t>
+            </a:r>
+            <a:r>
+              <a:rPr lang="zh-CN" altLang="en-US" dirty="0"/>
+              <a:t>（用户单击</a:t>
+            </a:r>
+            <a:r>
+              <a:rPr lang="en-US" altLang="zh-CN" dirty="0"/>
+              <a:t>Error</a:t>
+            </a:r>
+            <a:r>
+              <a:rPr lang="zh-CN" altLang="en-US" dirty="0"/>
+              <a:t>能看到服务器返回的错误信息）</a:t>
+            </a:r>
+            <a:br>
+              <a:rPr lang="en-US" altLang="zh-CN" dirty="0"/>
+            </a:br>
+            <a:r>
+              <a:rPr lang="en-US" altLang="zh-CN" dirty="0"/>
+              <a:t>	</a:t>
+            </a:r>
+            <a:r>
+              <a:rPr lang="zh-CN" altLang="en-US" dirty="0"/>
+              <a:t>用户再次单击</a:t>
+            </a:r>
+            <a:r>
+              <a:rPr lang="en-US" altLang="zh-CN" dirty="0"/>
+              <a:t>Start</a:t>
+            </a:r>
+            <a:r>
+              <a:rPr lang="zh-CN" altLang="en-US" dirty="0"/>
+              <a:t>则重新开始生成该用户的报表 </a:t>
+            </a:r>
+            <a:br>
+              <a:rPr lang="en-US" altLang="zh-CN" dirty="0"/>
+            </a:br>
+            <a:r>
+              <a:rPr lang="en-US" altLang="zh-CN" dirty="0"/>
+              <a:t>	/p/</a:t>
+            </a:r>
+            <a:r>
               <a:rPr lang="en-US" altLang="zh-CN" dirty="0" err="1"/>
-              <a:t>NewReport</a:t>
-            </a:r>
-            <a:r>
-              <a:rPr lang="en-US" altLang="zh-CN" dirty="0"/>
-              <a:t> API</a:t>
-            </a:r>
-            <a:r>
-              <a:rPr lang="zh-CN" altLang="en-US" dirty="0"/>
-              <a:t>并设置状态为</a:t>
-            </a:r>
-            <a:r>
-              <a:rPr lang="en-US" altLang="zh-CN" dirty="0"/>
-              <a:t>In Progress</a:t>
-            </a:r>
-            <a:r>
-              <a:rPr lang="zh-CN" altLang="en-US" dirty="0"/>
-              <a:t>直到返回结果后设为</a:t>
-            </a:r>
-            <a:r>
-              <a:rPr lang="en-US" altLang="zh-CN" dirty="0"/>
-              <a:t>Committed</a:t>
-            </a:r>
-            <a:br>
-              <a:rPr lang="en-US" altLang="zh-CN" dirty="0"/>
-            </a:br>
-            <a:r>
-              <a:rPr lang="en-US" altLang="zh-CN" dirty="0"/>
-              <a:t>	</a:t>
-            </a:r>
-            <a:r>
-              <a:rPr lang="zh-CN" altLang="en-US" dirty="0"/>
-              <a:t>状态，若</a:t>
-            </a:r>
-            <a:r>
-              <a:rPr lang="en-US" altLang="zh-CN" dirty="0"/>
-              <a:t>API</a:t>
-            </a:r>
-            <a:r>
-              <a:rPr lang="zh-CN" altLang="en-US" dirty="0"/>
-              <a:t>返回出错，显示状态</a:t>
-            </a:r>
-            <a:r>
-              <a:rPr lang="en-US" altLang="zh-CN" dirty="0"/>
-              <a:t>Error</a:t>
-            </a:r>
-            <a:r>
-              <a:rPr lang="zh-CN" altLang="en-US" dirty="0"/>
-              <a:t>（用户单击</a:t>
-            </a:r>
-            <a:r>
-              <a:rPr lang="en-US" altLang="zh-CN" dirty="0"/>
-              <a:t>Error</a:t>
-            </a:r>
-            <a:r>
-              <a:rPr lang="zh-CN" altLang="en-US" dirty="0"/>
-              <a:t>能看到服务器返回的错误信息）</a:t>
-            </a:r>
-            <a:br>
-              <a:rPr lang="en-US" altLang="zh-CN" dirty="0"/>
-            </a:br>
-            <a:r>
-              <a:rPr lang="en-US" altLang="zh-CN" dirty="0"/>
-              <a:t>	</a:t>
-            </a:r>
-            <a:r>
-              <a:rPr lang="zh-CN" altLang="en-US" dirty="0"/>
-              <a:t>用户再次单击</a:t>
-            </a:r>
-            <a:r>
-              <a:rPr lang="en-US" altLang="zh-CN" dirty="0"/>
-              <a:t>Start</a:t>
-            </a:r>
-            <a:r>
-              <a:rPr lang="zh-CN" altLang="en-US" dirty="0"/>
-              <a:t>则重新开始生成该用户的报表 </a:t>
-            </a:r>
-            <a:br>
-              <a:rPr lang="en-US" altLang="zh-CN" dirty="0"/>
-            </a:br>
-            <a:r>
-              <a:rPr lang="en-US" altLang="zh-CN" dirty="0"/>
-              <a:t>	/p/</a:t>
-            </a:r>
-            <a:r>
-              <a:rPr lang="en-US" altLang="zh-CN" dirty="0" err="1"/>
-              <a:t>generate?periodcode</a:t>
+              <a:t>commit?periodcode</a:t>
             </a:r>
             <a:r>
               <a:rPr lang="en-US" altLang="zh-CN" dirty="0"/>
@@ -8339,7 +8345,7 @@
             </a:r>
             <a:r>
               <a:rPr lang="en-US" altLang="zh-CN" dirty="0"/>
-              <a:t>New Report</a:t>
+              <a:t>Commit API</a:t>
             </a:r>
             <a:r>
               <a:rPr lang="zh-CN" altLang="en-US" dirty="0"/>
@@ -8517,13 +8523,197 @@
           <a:lstStyle/>
           <a:p>
             <a:r>
-              <a:rPr lang="zh-CN" altLang="en-US"/>
-              <a:t>构思中</a:t>
-            </a:r>
-            <a:r>
-              <a:rPr lang="en-US" altLang="zh-CN" dirty="0"/>
-              <a:t>…</a:t>
-            </a:r>
+              <a:rPr lang="en-US" altLang="zh-CN" dirty="0"/>
+              <a:t>/p/</a:t>
+            </a:r>
+            <a:r>
+              <a:rPr lang="en-US" altLang="zh-CN" dirty="0" err="1"/>
+              <a:t>report?periodCode</a:t>
+            </a:r>
+            <a:r>
+              <a:rPr lang="en-US" altLang="zh-CN" dirty="0"/>
+              <a:t>=</a:t>
+            </a:r>
+            <a:r>
+              <a:rPr lang="en-US" altLang="zh-CN" b="1" dirty="0"/>
+              <a:t>[</a:t>
+            </a:r>
+            <a:r>
+              <a:rPr lang="en-US" altLang="zh-CN" b="1" dirty="0" err="1"/>
+              <a:t>PeriodCode</a:t>
+            </a:r>
+            <a:r>
+              <a:rPr lang="en-US" altLang="zh-CN" b="1" dirty="0"/>
+              <a:t>]</a:t>
+            </a:r>
+            <a:r>
+              <a:rPr lang="en-US" altLang="zh-CN" dirty="0"/>
+              <a:t>&amp;</a:t>
+            </a:r>
+            <a:r>
+              <a:rPr lang="en-US" altLang="zh-CN" dirty="0" err="1"/>
+              <a:t>companyCode</a:t>
+            </a:r>
+            <a:r>
+              <a:rPr lang="en-US" altLang="zh-CN" dirty="0"/>
+              <a:t>=</a:t>
+            </a:r>
+            <a:r>
+              <a:rPr lang="en-US" altLang="zh-CN" b="1" dirty="0"/>
+              <a:t>[</a:t>
+            </a:r>
+            <a:r>
+              <a:rPr lang="en-US" altLang="zh-CN" b="1" dirty="0" err="1"/>
+              <a:t>CompanyCode</a:t>
+            </a:r>
+            <a:r>
+              <a:rPr lang="en-US" altLang="zh-CN" b="1" dirty="0"/>
+              <a:t>]</a:t>
+            </a:r>
+            <a:r>
+              <a:rPr lang="en-US" altLang="zh-CN" dirty="0"/>
+              <a:t>&amp;</a:t>
+            </a:r>
+            <a:r>
+              <a:rPr lang="en-US" altLang="zh-CN" dirty="0" err="1"/>
+              <a:t>viewName</a:t>
+            </a:r>
+            <a:r>
+              <a:rPr lang="en-US" altLang="zh-CN" dirty="0"/>
+              <a:t>=</a:t>
+            </a:r>
+            <a:r>
+              <a:rPr lang="en-US" altLang="zh-CN" b="1" dirty="0"/>
+              <a:t>[</a:t>
+            </a:r>
+            <a:r>
+              <a:rPr lang="en-US" altLang="zh-CN" b="1" dirty="0" err="1"/>
+              <a:t>ViewName</a:t>
+            </a:r>
+            <a:r>
+              <a:rPr lang="en-US" altLang="zh-CN" b="1" dirty="0"/>
+              <a:t>]</a:t>
+            </a:r>
+            <a:r>
+              <a:rPr lang="en-US" altLang="zh-CN" dirty="0"/>
+              <a:t>&amp;</a:t>
+            </a:r>
+            <a:r>
+              <a:rPr lang="en-US" altLang="zh-CN" dirty="0" err="1"/>
+              <a:t>dir</a:t>
+            </a:r>
+            <a:r>
+              <a:rPr lang="en-US" altLang="zh-CN" dirty="0"/>
+              <a:t>=</a:t>
+            </a:r>
+            <a:r>
+              <a:rPr lang="en-US" altLang="zh-CN" b="1" dirty="0"/>
+              <a:t>[Direction (h/v)]</a:t>
+            </a:r>
+          </a:p>
+          <a:p>
+            <a:r>
+              <a:rPr lang="en-US" altLang="zh-CN" dirty="0" err="1"/>
+              <a:t>PeriodCode</a:t>
+            </a:r>
+            <a:r>
+              <a:rPr lang="en-US" altLang="zh-CN" dirty="0"/>
+              <a:t>: </a:t>
+            </a:r>
+            <a:r>
+              <a:rPr lang="zh-CN" altLang="en-US" dirty="0"/>
+              <a:t>缓存的</a:t>
+            </a:r>
+            <a:r>
+              <a:rPr lang="en-US" altLang="zh-CN" dirty="0"/>
+              <a:t>period</a:t>
+            </a:r>
+            <a:r>
+              <a:rPr lang="zh-CN" altLang="en-US" dirty="0"/>
+              <a:t>主键</a:t>
+            </a:r>
+            <a:endParaRPr lang="en-US" altLang="zh-CN" dirty="0"/>
+          </a:p>
+          <a:p>
+            <a:r>
+              <a:rPr lang="en-US" altLang="zh-CN" dirty="0" err="1"/>
+              <a:t>CompanyCode</a:t>
+            </a:r>
+            <a:r>
+              <a:rPr lang="en-US" altLang="zh-CN" dirty="0"/>
+              <a:t>: </a:t>
+            </a:r>
+            <a:r>
+              <a:rPr lang="zh-CN" altLang="en-US" dirty="0"/>
+              <a:t>缓存的公司主键</a:t>
+            </a:r>
+            <a:endParaRPr lang="en-US" altLang="zh-CN" dirty="0"/>
+          </a:p>
+          <a:p>
+            <a:r>
+              <a:rPr lang="en-US" altLang="zh-CN" dirty="0" err="1"/>
+              <a:t>ViewName</a:t>
+            </a:r>
+            <a:r>
+              <a:rPr lang="en-US" altLang="zh-CN" dirty="0"/>
+              <a:t>: </a:t>
+            </a:r>
+            <a:r>
+              <a:rPr lang="en-US" altLang="zh-CN" dirty="0" err="1"/>
+              <a:t>Payslip</a:t>
+            </a:r>
+            <a:r>
+              <a:rPr lang="en-US" altLang="zh-CN" dirty="0"/>
+              <a:t> / Report</a:t>
+            </a:r>
+            <a:r>
+              <a:rPr lang="zh-CN" altLang="en-US" dirty="0"/>
+              <a:t>，其中</a:t>
+            </a:r>
+            <a:r>
+              <a:rPr lang="en-US" altLang="zh-CN" dirty="0" err="1"/>
+              <a:t>Payslip</a:t>
+            </a:r>
+            <a:r>
+              <a:rPr lang="zh-CN" altLang="en-US" dirty="0"/>
+              <a:t>需要垂直显示（</a:t>
+            </a:r>
+            <a:r>
+              <a:rPr lang="en-US" altLang="zh-CN" dirty="0" err="1"/>
+              <a:t>dir</a:t>
+            </a:r>
+            <a:r>
+              <a:rPr lang="en-US" altLang="zh-CN" dirty="0"/>
+              <a:t>=v</a:t>
+            </a:r>
+            <a:r>
+              <a:rPr lang="zh-CN" altLang="en-US" dirty="0"/>
+              <a:t>），</a:t>
+            </a:r>
+            <a:r>
+              <a:rPr lang="en-US" altLang="zh-CN" dirty="0"/>
+              <a:t>Report</a:t>
+            </a:r>
+            <a:r>
+              <a:rPr lang="zh-CN" altLang="en-US" dirty="0"/>
+              <a:t>则为水平显示（</a:t>
+            </a:r>
+            <a:r>
+              <a:rPr lang="en-US" altLang="zh-CN" dirty="0" err="1"/>
+              <a:t>dir</a:t>
+            </a:r>
+            <a:r>
+              <a:rPr lang="en-US" altLang="zh-CN" dirty="0"/>
+              <a:t>=h</a:t>
+            </a:r>
+            <a:r>
+              <a:rPr lang="zh-CN" altLang="en-US" dirty="0"/>
+              <a:t>）</a:t>
+            </a:r>
+            <a:br>
+              <a:rPr lang="en-US" altLang="zh-CN" dirty="0"/>
+            </a:br>
+            <a:endParaRPr lang="en-US" altLang="zh-CN" dirty="0"/>
           </a:p>
         </p:txBody>
       </p:sp>
@@ -8531,6 +8721,426 @@
     <p:extLst>
       <p:ext uri="{BB962C8B-B14F-4D97-AF65-F5344CB8AC3E}">
         <p14:creationId xmlns:p14="http://schemas.microsoft.com/office/powerpoint/2010/main" val="1599971499"/>
+      </p:ext>
+    </p:extLst>
+  </p:cSld>
+  <p:clrMapOvr>
+    <a:masterClrMapping/>
+  </p:clrMapOvr>
+</p:sld>
+</file>
+
+<file path=ppt/slides/slide14.xml><?xml version="1.0" encoding="utf-8"?>
+<p:sld xmlns:a="http://schemas.openxmlformats.org/drawingml/2006/main" xmlns:r="http://schemas.openxmlformats.org/officeDocument/2006/relationships" xmlns:p="http://schemas.openxmlformats.org/presentationml/2006/main">
+  <p:cSld>
+    <p:spTree>
+      <p:nvGrpSpPr>
+        <p:cNvPr id="1" name=""/>
+        <p:cNvGrpSpPr/>
+        <p:nvPr/>
+      </p:nvGrpSpPr>
+      <p:grpSpPr>
+        <a:xfrm>
+          <a:off x="0" y="0"/>
+          <a:ext cx="0" cy="0"/>
+          <a:chOff x="0" y="0"/>
+          <a:chExt cx="0" cy="0"/>
+        </a:xfrm>
+      </p:grpSpPr>
+      <p:sp>
+        <p:nvSpPr>
+          <p:cNvPr id="2" name="Title 1">
+            <a:extLst>
+              <a:ext uri="{FF2B5EF4-FFF2-40B4-BE49-F238E27FC236}">
+                <a16:creationId xmlns:a16="http://schemas.microsoft.com/office/drawing/2014/main" id="{E20A3793-8CD1-445F-A14E-8A6A6112E57D}"/>
+              </a:ext>
+            </a:extLst>
+          </p:cNvPr>
+          <p:cNvSpPr>
+            <a:spLocks noGrp="1"/>
+          </p:cNvSpPr>
+          <p:nvPr>
+            <p:ph type="title"/>
+          </p:nvPr>
+        </p:nvSpPr>
+        <p:spPr/>
+        <p:txBody>
+          <a:bodyPr/>
+          <a:lstStyle/>
+          <a:p>
+            <a:r>
+              <a:rPr lang="zh-CN" altLang="en-US" dirty="0"/>
+              <a:t>工资结算</a:t>
+            </a:r>
+            <a:r>
+              <a:rPr lang="en-US" altLang="zh-CN" dirty="0"/>
+              <a:t>Payroll calculation</a:t>
+            </a:r>
+            <a:br>
+              <a:rPr lang="en-US" altLang="zh-CN" dirty="0"/>
+            </a:br>
+            <a:r>
+              <a:rPr lang="en-US" altLang="zh-CN" dirty="0"/>
+              <a:t>Step 4 – </a:t>
+            </a:r>
+            <a:r>
+              <a:rPr lang="zh-CN" altLang="en-US" dirty="0"/>
+              <a:t>垂直显示</a:t>
+            </a:r>
+            <a:endParaRPr lang="en-US" dirty="0"/>
+          </a:p>
+        </p:txBody>
+      </p:sp>
+      <p:pic>
+        <p:nvPicPr>
+          <p:cNvPr id="4" name="Content Placeholder 3">
+            <a:extLst>
+              <a:ext uri="{FF2B5EF4-FFF2-40B4-BE49-F238E27FC236}">
+                <a16:creationId xmlns:a16="http://schemas.microsoft.com/office/drawing/2014/main" id="{8D05760B-D548-4E63-9577-EFB9312D473B}"/>
+              </a:ext>
+            </a:extLst>
+          </p:cNvPr>
+          <p:cNvPicPr>
+            <a:picLocks noGrp="1" noChangeAspect="1"/>
+          </p:cNvPicPr>
+          <p:nvPr>
+            <p:ph idx="1"/>
+          </p:nvPr>
+        </p:nvPicPr>
+        <p:blipFill>
+          <a:blip r:embed="rId2"/>
+          <a:stretch>
+            <a:fillRect/>
+          </a:stretch>
+        </p:blipFill>
+        <p:spPr>
+          <a:xfrm>
+            <a:off x="1321269" y="1874516"/>
+            <a:ext cx="3487797" cy="4690707"/>
+          </a:xfrm>
+          <a:prstGeom prst="rect">
+            <a:avLst/>
+          </a:prstGeom>
+        </p:spPr>
+      </p:pic>
+      <p:pic>
+        <p:nvPicPr>
+          <p:cNvPr id="6" name="Picture 5">
+            <a:extLst>
+              <a:ext uri="{FF2B5EF4-FFF2-40B4-BE49-F238E27FC236}">
+                <a16:creationId xmlns:a16="http://schemas.microsoft.com/office/drawing/2014/main" id="{268124BD-051C-4DE6-A5CA-45508BC5E586}"/>
+              </a:ext>
+            </a:extLst>
+          </p:cNvPr>
+          <p:cNvPicPr>
+            <a:picLocks noChangeAspect="1"/>
+          </p:cNvPicPr>
+          <p:nvPr/>
+        </p:nvPicPr>
+        <p:blipFill>
+          <a:blip r:embed="rId3"/>
+          <a:stretch>
+            <a:fillRect/>
+          </a:stretch>
+        </p:blipFill>
+        <p:spPr>
+          <a:xfrm>
+            <a:off x="4878657" y="1874516"/>
+            <a:ext cx="4575808" cy="4681654"/>
+          </a:xfrm>
+          <a:prstGeom prst="rect">
+            <a:avLst/>
+          </a:prstGeom>
+        </p:spPr>
+      </p:pic>
+      <p:sp>
+        <p:nvSpPr>
+          <p:cNvPr id="7" name="TextBox 6">
+            <a:extLst>
+              <a:ext uri="{FF2B5EF4-FFF2-40B4-BE49-F238E27FC236}">
+                <a16:creationId xmlns:a16="http://schemas.microsoft.com/office/drawing/2014/main" id="{220B35F0-7E6F-4B01-BAFC-F37366575B8C}"/>
+              </a:ext>
+            </a:extLst>
+          </p:cNvPr>
+          <p:cNvSpPr txBox="1"/>
+          <p:nvPr/>
+        </p:nvSpPr>
+        <p:spPr>
+          <a:xfrm>
+            <a:off x="6975132" y="3846011"/>
+            <a:ext cx="3726735" cy="923330"/>
+          </a:xfrm>
+          <a:prstGeom prst="rect">
+            <a:avLst/>
+          </a:prstGeom>
+          <a:noFill/>
+        </p:spPr>
+        <p:txBody>
+          <a:bodyPr wrap="square" rtlCol="0">
+            <a:spAutoFit/>
+          </a:bodyPr>
+          <a:lstStyle/>
+          <a:p>
+            <a:r>
+              <a:rPr lang="en-US" dirty="0" err="1"/>
+              <a:t>DisplayIndex</a:t>
+            </a:r>
+            <a:r>
+              <a:rPr lang="en-US" dirty="0"/>
+              <a:t> </a:t>
+            </a:r>
+            <a:r>
+              <a:rPr lang="zh-CN" altLang="en-US" dirty="0"/>
+              <a:t>越大，显示地越下面</a:t>
+            </a:r>
+            <a:endParaRPr lang="en-US" altLang="zh-CN" dirty="0"/>
+          </a:p>
+          <a:p>
+            <a:r>
+              <a:rPr lang="en-US" altLang="zh-CN" dirty="0"/>
+              <a:t>Category</a:t>
+            </a:r>
+            <a:r>
+              <a:rPr lang="zh-CN" altLang="en-US" dirty="0"/>
+              <a:t>相同的显示 在一起并且显示各项求和 </a:t>
+            </a:r>
+            <a:endParaRPr lang="en-US" dirty="0"/>
+          </a:p>
+        </p:txBody>
+      </p:sp>
+    </p:spTree>
+    <p:extLst>
+      <p:ext uri="{BB962C8B-B14F-4D97-AF65-F5344CB8AC3E}">
+        <p14:creationId xmlns:p14="http://schemas.microsoft.com/office/powerpoint/2010/main" val="1308848189"/>
+      </p:ext>
+    </p:extLst>
+  </p:cSld>
+  <p:clrMapOvr>
+    <a:masterClrMapping/>
+  </p:clrMapOvr>
+</p:sld>
+</file>
+
+<file path=ppt/slides/slide15.xml><?xml version="1.0" encoding="utf-8"?>
+<p:sld xmlns:a="http://schemas.openxmlformats.org/drawingml/2006/main" xmlns:r="http://schemas.openxmlformats.org/officeDocument/2006/relationships" xmlns:p="http://schemas.openxmlformats.org/presentationml/2006/main">
+  <p:cSld>
+    <p:spTree>
+      <p:nvGrpSpPr>
+        <p:cNvPr id="1" name=""/>
+        <p:cNvGrpSpPr/>
+        <p:nvPr/>
+      </p:nvGrpSpPr>
+      <p:grpSpPr>
+        <a:xfrm>
+          <a:off x="0" y="0"/>
+          <a:ext cx="0" cy="0"/>
+          <a:chOff x="0" y="0"/>
+          <a:chExt cx="0" cy="0"/>
+        </a:xfrm>
+      </p:grpSpPr>
+      <p:sp>
+        <p:nvSpPr>
+          <p:cNvPr id="2" name="Title 1">
+            <a:extLst>
+              <a:ext uri="{FF2B5EF4-FFF2-40B4-BE49-F238E27FC236}">
+                <a16:creationId xmlns:a16="http://schemas.microsoft.com/office/drawing/2014/main" id="{E20A3793-8CD1-445F-A14E-8A6A6112E57D}"/>
+              </a:ext>
+            </a:extLst>
+          </p:cNvPr>
+          <p:cNvSpPr>
+            <a:spLocks noGrp="1"/>
+          </p:cNvSpPr>
+          <p:nvPr>
+            <p:ph type="title"/>
+          </p:nvPr>
+        </p:nvSpPr>
+        <p:spPr/>
+        <p:txBody>
+          <a:bodyPr/>
+          <a:lstStyle/>
+          <a:p>
+            <a:r>
+              <a:rPr lang="zh-CN" altLang="en-US" dirty="0"/>
+              <a:t>工资结算</a:t>
+            </a:r>
+            <a:r>
+              <a:rPr lang="en-US" altLang="zh-CN" dirty="0"/>
+              <a:t>Payroll calculation</a:t>
+            </a:r>
+            <a:br>
+              <a:rPr lang="en-US" altLang="zh-CN" dirty="0"/>
+            </a:br>
+            <a:r>
+              <a:rPr lang="en-US" altLang="zh-CN" dirty="0"/>
+              <a:t>Step 4 – </a:t>
+            </a:r>
+            <a:r>
+              <a:rPr lang="zh-CN" altLang="en-US" dirty="0"/>
+              <a:t>水平显示</a:t>
+            </a:r>
+            <a:endParaRPr lang="en-US" dirty="0"/>
+          </a:p>
+        </p:txBody>
+      </p:sp>
+      <p:sp>
+        <p:nvSpPr>
+          <p:cNvPr id="7" name="TextBox 6">
+            <a:extLst>
+              <a:ext uri="{FF2B5EF4-FFF2-40B4-BE49-F238E27FC236}">
+                <a16:creationId xmlns:a16="http://schemas.microsoft.com/office/drawing/2014/main" id="{220B35F0-7E6F-4B01-BAFC-F37366575B8C}"/>
+              </a:ext>
+            </a:extLst>
+          </p:cNvPr>
+          <p:cNvSpPr txBox="1"/>
+          <p:nvPr/>
+        </p:nvSpPr>
+        <p:spPr>
+          <a:xfrm>
+            <a:off x="4267200" y="3795211"/>
+            <a:ext cx="7857067" cy="923330"/>
+          </a:xfrm>
+          <a:prstGeom prst="rect">
+            <a:avLst/>
+          </a:prstGeom>
+          <a:noFill/>
+        </p:spPr>
+        <p:txBody>
+          <a:bodyPr wrap="square" rtlCol="0">
+            <a:spAutoFit/>
+          </a:bodyPr>
+          <a:lstStyle/>
+          <a:p>
+            <a:r>
+              <a:rPr lang="en-US" dirty="0" err="1"/>
+              <a:t>DisplayIndex</a:t>
+            </a:r>
+            <a:r>
+              <a:rPr lang="en-US" dirty="0"/>
+              <a:t> </a:t>
+            </a:r>
+            <a:r>
+              <a:rPr lang="zh-CN" altLang="en-US" dirty="0"/>
+              <a:t>越大，显示地越右面，带有</a:t>
+            </a:r>
+            <a:r>
+              <a:rPr lang="en-US" altLang="zh-CN" dirty="0" err="1"/>
+              <a:t>DisplayIndex</a:t>
+            </a:r>
+            <a:r>
+              <a:rPr lang="zh-CN" altLang="en-US" dirty="0"/>
+              <a:t>的列需要求和显示在最下面</a:t>
+            </a:r>
+            <a:endParaRPr lang="en-US" altLang="zh-CN" dirty="0"/>
+          </a:p>
+          <a:p>
+            <a:r>
+              <a:rPr lang="en-US" altLang="zh-CN" dirty="0"/>
+              <a:t>Category</a:t>
+            </a:r>
+            <a:r>
+              <a:rPr lang="zh-CN" altLang="en-US" dirty="0"/>
+              <a:t>相同的显示在一起并且单独显示一行标题</a:t>
+            </a:r>
+            <a:endParaRPr lang="en-US" altLang="zh-CN" dirty="0"/>
+          </a:p>
+        </p:txBody>
+      </p:sp>
+      <p:pic>
+        <p:nvPicPr>
+          <p:cNvPr id="8" name="Content Placeholder 7">
+            <a:extLst>
+              <a:ext uri="{FF2B5EF4-FFF2-40B4-BE49-F238E27FC236}">
+                <a16:creationId xmlns:a16="http://schemas.microsoft.com/office/drawing/2014/main" id="{25217654-5C30-45EE-863A-3CEA1D6CF2A4}"/>
+              </a:ext>
+            </a:extLst>
+          </p:cNvPr>
+          <p:cNvPicPr>
+            <a:picLocks noGrp="1" noChangeAspect="1"/>
+          </p:cNvPicPr>
+          <p:nvPr>
+            <p:ph idx="1"/>
+          </p:nvPr>
+        </p:nvPicPr>
+        <p:blipFill>
+          <a:blip r:embed="rId2"/>
+          <a:stretch>
+            <a:fillRect/>
+          </a:stretch>
+        </p:blipFill>
+        <p:spPr>
+          <a:xfrm>
+            <a:off x="1251678" y="1874517"/>
+            <a:ext cx="10179050" cy="1782684"/>
+          </a:xfrm>
+          <a:prstGeom prst="rect">
+            <a:avLst/>
+          </a:prstGeom>
+        </p:spPr>
+      </p:pic>
+      <p:pic>
+        <p:nvPicPr>
+          <p:cNvPr id="9" name="Picture 8">
+            <a:extLst>
+              <a:ext uri="{FF2B5EF4-FFF2-40B4-BE49-F238E27FC236}">
+                <a16:creationId xmlns:a16="http://schemas.microsoft.com/office/drawing/2014/main" id="{3C0DE36A-0566-4C74-9CEC-09E03DBC6454}"/>
+              </a:ext>
+            </a:extLst>
+          </p:cNvPr>
+          <p:cNvPicPr>
+            <a:picLocks noChangeAspect="1"/>
+          </p:cNvPicPr>
+          <p:nvPr/>
+        </p:nvPicPr>
+        <p:blipFill>
+          <a:blip r:embed="rId3"/>
+          <a:stretch>
+            <a:fillRect/>
+          </a:stretch>
+        </p:blipFill>
+        <p:spPr>
+          <a:xfrm>
+            <a:off x="1251678" y="3471296"/>
+            <a:ext cx="3015522" cy="3391121"/>
+          </a:xfrm>
+          <a:prstGeom prst="rect">
+            <a:avLst/>
+          </a:prstGeom>
+        </p:spPr>
+      </p:pic>
+      <p:pic>
+        <p:nvPicPr>
+          <p:cNvPr id="12" name="Picture 11">
+            <a:extLst>
+              <a:ext uri="{FF2B5EF4-FFF2-40B4-BE49-F238E27FC236}">
+                <a16:creationId xmlns:a16="http://schemas.microsoft.com/office/drawing/2014/main" id="{D06900E3-FF7A-49A1-B902-A482D39FFC02}"/>
+              </a:ext>
+            </a:extLst>
+          </p:cNvPr>
+          <p:cNvPicPr>
+            <a:picLocks noChangeAspect="1"/>
+          </p:cNvPicPr>
+          <p:nvPr/>
+        </p:nvPicPr>
+        <p:blipFill>
+          <a:blip r:embed="rId4"/>
+          <a:stretch>
+            <a:fillRect/>
+          </a:stretch>
+        </p:blipFill>
+        <p:spPr>
+          <a:xfrm>
+            <a:off x="6646332" y="4767189"/>
+            <a:ext cx="5545667" cy="2095228"/>
+          </a:xfrm>
+          <a:prstGeom prst="rect">
+            <a:avLst/>
+          </a:prstGeom>
+        </p:spPr>
+      </p:pic>
+    </p:spTree>
+    <p:extLst>
+      <p:ext uri="{BB962C8B-B14F-4D97-AF65-F5344CB8AC3E}">
+        <p14:creationId xmlns:p14="http://schemas.microsoft.com/office/powerpoint/2010/main" val="1752795323"/>
       </p:ext>
     </p:extLst>
   </p:cSld>

</xml_diff>